<commit_message>
Minor: fixing authors metadata, and link. Things are missing ... e.g. project acknowledge and logo that is funding your trip. More comments in email
</commit_message>
<xml_diff>
--- a/Papers/WWW'15 - Automatic Validation, Correction and Generation of Dataset Metadata - Enhancing Dataset Search and Spam Detection/poster/www15-poster.pptx
+++ b/Papers/WWW'15 - Automatic Validation, Correction and Generation of Dataset Metadata - Enhancing Dataset Search and Spam Detection/poster/www15-poster.pptx
@@ -106,7 +106,7 @@
   </p:defaultTextStyle>
   <p:extLst>
     <p:ext uri="{EFAFB233-063F-42B5-8137-9DF3F51BA10A}">
-      <p15:sldGuideLst xmlns:p15="http://schemas.microsoft.com/office/powerpoint/2012/main">
+      <p15:sldGuideLst xmlns:p15="http://schemas.microsoft.com/office/powerpoint/2012/main" xmlns="">
         <p15:guide id="1" orient="horz" pos="13536">
           <p15:clr>
             <a:srgbClr val="A4A3A4"/>
@@ -305,7 +305,7 @@
             <a:fld id="{AB3B3CD4-9605-4B16-ADF1-526C2BC53AE0}" type="datetimeFigureOut">
               <a:rPr lang="en-US" smtClean="0"/>
               <a:pPr/>
-              <a:t>5/11/15</a:t>
+              <a:t>5/12/2015</a:t>
             </a:fld>
             <a:endParaRPr lang="en-US" dirty="0"/>
           </a:p>
@@ -357,7 +357,7 @@
     </p:spTree>
     <p:extLst>
       <p:ext uri="{BB962C8B-B14F-4D97-AF65-F5344CB8AC3E}">
-        <p14:creationId xmlns:p14="http://schemas.microsoft.com/office/powerpoint/2010/main" val="3498610242"/>
+        <p14:creationId xmlns:p14="http://schemas.microsoft.com/office/powerpoint/2010/main" xmlns="" val="3498610242"/>
       </p:ext>
     </p:extLst>
   </p:cSld>
@@ -477,7 +477,7 @@
             <a:fld id="{AB3B3CD4-9605-4B16-ADF1-526C2BC53AE0}" type="datetimeFigureOut">
               <a:rPr lang="en-US" smtClean="0"/>
               <a:pPr/>
-              <a:t>5/11/15</a:t>
+              <a:t>5/12/2015</a:t>
             </a:fld>
             <a:endParaRPr lang="en-US" dirty="0"/>
           </a:p>
@@ -529,7 +529,7 @@
     </p:spTree>
     <p:extLst>
       <p:ext uri="{BB962C8B-B14F-4D97-AF65-F5344CB8AC3E}">
-        <p14:creationId xmlns:p14="http://schemas.microsoft.com/office/powerpoint/2010/main" val="3408886510"/>
+        <p14:creationId xmlns:p14="http://schemas.microsoft.com/office/powerpoint/2010/main" xmlns="" val="3408886510"/>
       </p:ext>
     </p:extLst>
   </p:cSld>
@@ -659,7 +659,7 @@
             <a:fld id="{AB3B3CD4-9605-4B16-ADF1-526C2BC53AE0}" type="datetimeFigureOut">
               <a:rPr lang="en-US" smtClean="0"/>
               <a:pPr/>
-              <a:t>5/11/15</a:t>
+              <a:t>5/12/2015</a:t>
             </a:fld>
             <a:endParaRPr lang="en-US" dirty="0"/>
           </a:p>
@@ -711,7 +711,7 @@
     </p:spTree>
     <p:extLst>
       <p:ext uri="{BB962C8B-B14F-4D97-AF65-F5344CB8AC3E}">
-        <p14:creationId xmlns:p14="http://schemas.microsoft.com/office/powerpoint/2010/main" val="3220719012"/>
+        <p14:creationId xmlns:p14="http://schemas.microsoft.com/office/powerpoint/2010/main" xmlns="" val="3220719012"/>
       </p:ext>
     </p:extLst>
   </p:cSld>
@@ -831,7 +831,7 @@
             <a:fld id="{AB3B3CD4-9605-4B16-ADF1-526C2BC53AE0}" type="datetimeFigureOut">
               <a:rPr lang="en-US" smtClean="0"/>
               <a:pPr/>
-              <a:t>5/11/15</a:t>
+              <a:t>5/12/2015</a:t>
             </a:fld>
             <a:endParaRPr lang="en-US" dirty="0"/>
           </a:p>
@@ -883,7 +883,7 @@
     </p:spTree>
     <p:extLst>
       <p:ext uri="{BB962C8B-B14F-4D97-AF65-F5344CB8AC3E}">
-        <p14:creationId xmlns:p14="http://schemas.microsoft.com/office/powerpoint/2010/main" val="234576983"/>
+        <p14:creationId xmlns:p14="http://schemas.microsoft.com/office/powerpoint/2010/main" xmlns="" val="234576983"/>
       </p:ext>
     </p:extLst>
   </p:cSld>
@@ -1079,7 +1079,7 @@
             <a:fld id="{AB3B3CD4-9605-4B16-ADF1-526C2BC53AE0}" type="datetimeFigureOut">
               <a:rPr lang="en-US" smtClean="0"/>
               <a:pPr/>
-              <a:t>5/11/15</a:t>
+              <a:t>5/12/2015</a:t>
             </a:fld>
             <a:endParaRPr lang="en-US" dirty="0"/>
           </a:p>
@@ -1131,7 +1131,7 @@
     </p:spTree>
     <p:extLst>
       <p:ext uri="{BB962C8B-B14F-4D97-AF65-F5344CB8AC3E}">
-        <p14:creationId xmlns:p14="http://schemas.microsoft.com/office/powerpoint/2010/main" val="2455031330"/>
+        <p14:creationId xmlns:p14="http://schemas.microsoft.com/office/powerpoint/2010/main" xmlns="" val="2455031330"/>
       </p:ext>
     </p:extLst>
   </p:cSld>
@@ -1369,7 +1369,7 @@
             <a:fld id="{AB3B3CD4-9605-4B16-ADF1-526C2BC53AE0}" type="datetimeFigureOut">
               <a:rPr lang="en-US" smtClean="0"/>
               <a:pPr/>
-              <a:t>5/11/15</a:t>
+              <a:t>5/12/2015</a:t>
             </a:fld>
             <a:endParaRPr lang="en-US" dirty="0"/>
           </a:p>
@@ -1421,7 +1421,7 @@
     </p:spTree>
     <p:extLst>
       <p:ext uri="{BB962C8B-B14F-4D97-AF65-F5344CB8AC3E}">
-        <p14:creationId xmlns:p14="http://schemas.microsoft.com/office/powerpoint/2010/main" val="3551008444"/>
+        <p14:creationId xmlns:p14="http://schemas.microsoft.com/office/powerpoint/2010/main" xmlns="" val="3551008444"/>
       </p:ext>
     </p:extLst>
   </p:cSld>
@@ -1798,7 +1798,7 @@
             <a:fld id="{AB3B3CD4-9605-4B16-ADF1-526C2BC53AE0}" type="datetimeFigureOut">
               <a:rPr lang="en-US" smtClean="0"/>
               <a:pPr/>
-              <a:t>5/11/15</a:t>
+              <a:t>5/12/2015</a:t>
             </a:fld>
             <a:endParaRPr lang="en-US" dirty="0"/>
           </a:p>
@@ -1850,7 +1850,7 @@
     </p:spTree>
     <p:extLst>
       <p:ext uri="{BB962C8B-B14F-4D97-AF65-F5344CB8AC3E}">
-        <p14:creationId xmlns:p14="http://schemas.microsoft.com/office/powerpoint/2010/main" val="2621549410"/>
+        <p14:creationId xmlns:p14="http://schemas.microsoft.com/office/powerpoint/2010/main" xmlns="" val="2621549410"/>
       </p:ext>
     </p:extLst>
   </p:cSld>
@@ -1918,7 +1918,7 @@
             <a:fld id="{AB3B3CD4-9605-4B16-ADF1-526C2BC53AE0}" type="datetimeFigureOut">
               <a:rPr lang="en-US" smtClean="0"/>
               <a:pPr/>
-              <a:t>5/11/15</a:t>
+              <a:t>5/12/2015</a:t>
             </a:fld>
             <a:endParaRPr lang="en-US" dirty="0"/>
           </a:p>
@@ -1970,7 +1970,7 @@
     </p:spTree>
     <p:extLst>
       <p:ext uri="{BB962C8B-B14F-4D97-AF65-F5344CB8AC3E}">
-        <p14:creationId xmlns:p14="http://schemas.microsoft.com/office/powerpoint/2010/main" val="2337226835"/>
+        <p14:creationId xmlns:p14="http://schemas.microsoft.com/office/powerpoint/2010/main" xmlns="" val="2337226835"/>
       </p:ext>
     </p:extLst>
   </p:cSld>
@@ -2015,7 +2015,7 @@
             <a:fld id="{AB3B3CD4-9605-4B16-ADF1-526C2BC53AE0}" type="datetimeFigureOut">
               <a:rPr lang="en-US" smtClean="0"/>
               <a:pPr/>
-              <a:t>5/11/15</a:t>
+              <a:t>5/12/2015</a:t>
             </a:fld>
             <a:endParaRPr lang="en-US" dirty="0"/>
           </a:p>
@@ -2067,7 +2067,7 @@
     </p:spTree>
     <p:extLst>
       <p:ext uri="{BB962C8B-B14F-4D97-AF65-F5344CB8AC3E}">
-        <p14:creationId xmlns:p14="http://schemas.microsoft.com/office/powerpoint/2010/main" val="3450073293"/>
+        <p14:creationId xmlns:p14="http://schemas.microsoft.com/office/powerpoint/2010/main" xmlns="" val="3450073293"/>
       </p:ext>
     </p:extLst>
   </p:cSld>
@@ -2294,7 +2294,7 @@
             <a:fld id="{AB3B3CD4-9605-4B16-ADF1-526C2BC53AE0}" type="datetimeFigureOut">
               <a:rPr lang="en-US" smtClean="0"/>
               <a:pPr/>
-              <a:t>5/11/15</a:t>
+              <a:t>5/12/2015</a:t>
             </a:fld>
             <a:endParaRPr lang="en-US" dirty="0"/>
           </a:p>
@@ -2346,7 +2346,7 @@
     </p:spTree>
     <p:extLst>
       <p:ext uri="{BB962C8B-B14F-4D97-AF65-F5344CB8AC3E}">
-        <p14:creationId xmlns:p14="http://schemas.microsoft.com/office/powerpoint/2010/main" val="2517025264"/>
+        <p14:creationId xmlns:p14="http://schemas.microsoft.com/office/powerpoint/2010/main" xmlns="" val="2517025264"/>
       </p:ext>
     </p:extLst>
   </p:cSld>
@@ -2549,7 +2549,7 @@
             <a:fld id="{AB3B3CD4-9605-4B16-ADF1-526C2BC53AE0}" type="datetimeFigureOut">
               <a:rPr lang="en-US" smtClean="0"/>
               <a:pPr/>
-              <a:t>5/11/15</a:t>
+              <a:t>5/12/2015</a:t>
             </a:fld>
             <a:endParaRPr lang="en-US" dirty="0"/>
           </a:p>
@@ -2601,7 +2601,7 @@
     </p:spTree>
     <p:extLst>
       <p:ext uri="{BB962C8B-B14F-4D97-AF65-F5344CB8AC3E}">
-        <p14:creationId xmlns:p14="http://schemas.microsoft.com/office/powerpoint/2010/main" val="3855469034"/>
+        <p14:creationId xmlns:p14="http://schemas.microsoft.com/office/powerpoint/2010/main" xmlns="" val="3855469034"/>
       </p:ext>
     </p:extLst>
   </p:cSld>
@@ -2764,7 +2764,7 @@
             <a:fld id="{AB3B3CD4-9605-4B16-ADF1-526C2BC53AE0}" type="datetimeFigureOut">
               <a:rPr lang="en-US" smtClean="0"/>
               <a:pPr/>
-              <a:t>5/11/15</a:t>
+              <a:t>5/12/2015</a:t>
             </a:fld>
             <a:endParaRPr lang="en-US" dirty="0"/>
           </a:p>
@@ -2852,7 +2852,7 @@
     </p:spTree>
     <p:extLst>
       <p:ext uri="{BB962C8B-B14F-4D97-AF65-F5344CB8AC3E}">
-        <p14:creationId xmlns:p14="http://schemas.microsoft.com/office/powerpoint/2010/main" val="1581356310"/>
+        <p14:creationId xmlns:p14="http://schemas.microsoft.com/office/powerpoint/2010/main" xmlns="" val="1581356310"/>
       </p:ext>
     </p:extLst>
   </p:cSld>
@@ -3190,13 +3190,10 @@
           <a:p>
             <a:pPr algn="ctr"/>
             <a:r>
-              <a:rPr lang="en-US" sz="3600" dirty="0" err="1"/>
-              <a:t>ahmad.assaf@sap.com</a:t>
-            </a:r>
-            <a:r>
-              <a:rPr lang="en-US" sz="3600" dirty="0"/>
-              <a:t> </a:t>
-            </a:r>
+              <a:rPr lang="en-US" sz="3600" dirty="0" smtClean="0"/>
+              <a:t>aline.senart@sap.com </a:t>
+            </a:r>
+            <a:endParaRPr lang="en-US" sz="3600" dirty="0"/>
           </a:p>
         </p:txBody>
       </p:sp>
@@ -3212,7 +3209,7 @@
           <a:blip r:embed="rId2" cstate="print">
             <a:extLst>
               <a:ext uri="{28A0092B-C50C-407E-A947-70E740481C1C}">
-                <a14:useLocalDpi xmlns:a14="http://schemas.microsoft.com/office/drawing/2010/main" val="0"/>
+                <a14:useLocalDpi xmlns:a14="http://schemas.microsoft.com/office/drawing/2010/main" xmlns="" val="0"/>
               </a:ext>
             </a:extLst>
           </a:blip>
@@ -3265,7 +3262,6 @@
               <a:rPr lang="en-US" sz="6600" dirty="0"/>
               <a:t>Automatic Validation, Correction and Generation of Dataset Metadata - Enhancing Dataset Search and Spam Detection</a:t>
             </a:r>
-            <a:endParaRPr lang="en-US" sz="6600" dirty="0"/>
           </a:p>
         </p:txBody>
       </p:sp>
@@ -3356,11 +3352,7 @@
             </a:r>
             <a:r>
               <a:rPr lang="en-US" sz="4800" dirty="0" smtClean="0"/>
-              <a:t> </a:t>
-            </a:r>
-            <a:r>
-              <a:rPr lang="en-US" sz="4800" dirty="0" smtClean="0"/>
-              <a:t>and </a:t>
+              <a:t> and </a:t>
             </a:r>
             <a:r>
               <a:rPr lang="fr-FR" sz="4800" dirty="0" smtClean="0"/>
@@ -3429,13 +3421,10 @@
           <a:p>
             <a:pPr algn="ctr"/>
             <a:r>
-              <a:rPr lang="en-US" sz="3600" dirty="0" err="1"/>
-              <a:t>firstname.lastname@eurecom.fr</a:t>
-            </a:r>
-            <a:r>
-              <a:rPr lang="en-US" sz="3600" dirty="0"/>
-              <a:t> </a:t>
-            </a:r>
+              <a:rPr lang="en-US" sz="3600" dirty="0" smtClean="0"/>
+              <a:t>firstName.lastName@eurecom.fr </a:t>
+            </a:r>
+            <a:endParaRPr lang="en-US" sz="3600" dirty="0"/>
           </a:p>
         </p:txBody>
       </p:sp>
@@ -3448,10 +3437,10 @@
           <p:nvPr/>
         </p:nvPicPr>
         <p:blipFill>
-          <a:blip r:embed="rId3">
+          <a:blip r:embed="rId3" cstate="print">
             <a:extLst>
               <a:ext uri="{28A0092B-C50C-407E-A947-70E740481C1C}">
-                <a14:useLocalDpi xmlns:a14="http://schemas.microsoft.com/office/drawing/2010/main" val="0"/>
+                <a14:useLocalDpi xmlns:a14="http://schemas.microsoft.com/office/drawing/2010/main" xmlns="" val="0"/>
               </a:ext>
             </a:extLst>
           </a:blip>
@@ -3470,7 +3459,7 @@
           <a:noFill/>
           <a:extLst>
             <a:ext uri="{909E8E84-426E-40DD-AFC4-6F175D3DCCD1}">
-              <a14:hiddenFill xmlns:a14="http://schemas.microsoft.com/office/drawing/2010/main">
+              <a14:hiddenFill xmlns:a14="http://schemas.microsoft.com/office/drawing/2010/main" xmlns="">
                 <a:solidFill>
                   <a:srgbClr val="FFFFFF"/>
                 </a:solidFill>
@@ -3503,54 +3492,36 @@
           <a:p>
             <a:r>
               <a:rPr lang="en-US" sz="4400" b="1" dirty="0" smtClean="0"/>
-              <a:t>All </a:t>
-            </a:r>
-            <a:r>
-              <a:rPr lang="en-US" sz="4400" b="1" dirty="0" smtClean="0"/>
-              <a:t>results are reproducible from our code base at </a:t>
+              <a:t>All results are reproducible from our code base at </a:t>
             </a:r>
             <a:r>
               <a:rPr lang="en-US" sz="4400" b="1" dirty="0">
                 <a:solidFill>
                   <a:srgbClr val="3799F3"/>
                 </a:solidFill>
+                <a:hlinkClick r:id="rId4"/>
               </a:rPr>
-              <a:t>https://github.com/</a:t>
-            </a:r>
-            <a:r>
-              <a:rPr lang="en-US" sz="4400" b="1" dirty="0" err="1">
+              <a:t>https://</a:t>
+            </a:r>
+            <a:r>
+              <a:rPr lang="en-US" sz="4400" b="1" dirty="0" smtClean="0">
+                <a:solidFill>
+                  <a:srgbClr val="3799F3"/>
+                </a:solidFill>
+                <a:hlinkClick r:id="rId4"/>
+              </a:rPr>
+              <a:t>github.com/ahmadassaf/opendata-checker</a:t>
+            </a:r>
+            <a:r>
+              <a:rPr lang="en-US" sz="4400" b="1" dirty="0" smtClean="0">
                 <a:solidFill>
                   <a:srgbClr val="3799F3"/>
                 </a:solidFill>
               </a:rPr>
-              <a:t>ahmadassaf</a:t>
-            </a:r>
-            <a:r>
-              <a:rPr lang="en-US" sz="4400" b="1" dirty="0">
-                <a:solidFill>
-                  <a:srgbClr val="3799F3"/>
-                </a:solidFill>
-              </a:rPr>
-              <a:t>/</a:t>
-            </a:r>
-            <a:r>
-              <a:rPr lang="en-US" sz="4400" b="1" dirty="0" err="1">
-                <a:solidFill>
-                  <a:srgbClr val="3799F3"/>
-                </a:solidFill>
-              </a:rPr>
-              <a:t>opendata</a:t>
-            </a:r>
-            <a:r>
-              <a:rPr lang="en-US" sz="4400" b="1" dirty="0">
-                <a:solidFill>
-                  <a:srgbClr val="3799F3"/>
-                </a:solidFill>
-              </a:rPr>
-              <a:t>-checker</a:t>
-            </a:r>
-            <a:r>
-              <a:rPr lang="en-US" sz="4400" b="1" dirty="0"/>
+              <a:t> </a:t>
+            </a:r>
+            <a:r>
+              <a:rPr lang="en-US" sz="4400" b="1" dirty="0" smtClean="0"/>
               <a:t> </a:t>
             </a:r>
             <a:endParaRPr lang="en-US" sz="4400" b="1" dirty="0" smtClean="0"/>
@@ -3566,10 +3537,10 @@
           <p:nvPr/>
         </p:nvPicPr>
         <p:blipFill>
-          <a:blip r:embed="rId4">
+          <a:blip r:embed="rId5" cstate="print">
             <a:extLst>
               <a:ext uri="{28A0092B-C50C-407E-A947-70E740481C1C}">
-                <a14:useLocalDpi xmlns:a14="http://schemas.microsoft.com/office/drawing/2010/main" val="0"/>
+                <a14:useLocalDpi xmlns:a14="http://schemas.microsoft.com/office/drawing/2010/main" xmlns="" val="0"/>
               </a:ext>
             </a:extLst>
           </a:blip>
@@ -4329,7 +4300,6 @@
               <a:rPr lang="en-US" sz="3600" dirty="0"/>
               <a:t>up and tracked.</a:t>
             </a:r>
-            <a:endParaRPr lang="en-US" sz="3600" dirty="0"/>
           </a:p>
         </p:txBody>
       </p:sp>
@@ -4374,7 +4344,7 @@
     </p:spTree>
     <p:extLst>
       <p:ext uri="{BB962C8B-B14F-4D97-AF65-F5344CB8AC3E}">
-        <p14:creationId xmlns:p14="http://schemas.microsoft.com/office/powerpoint/2010/main" val="1783528801"/>
+        <p14:creationId xmlns:p14="http://schemas.microsoft.com/office/powerpoint/2010/main" xmlns="" val="1783528801"/>
       </p:ext>
     </p:extLst>
   </p:cSld>

</xml_diff>

<commit_message>
adding new arch diagram and editing the thesis background
</commit_message>
<xml_diff>
--- a/Papers/WWW'15 - Automatic Validation, Correction and Generation of Dataset Metadata - Enhancing Dataset Search and Spam Detection/poster/www15-poster.pptx
+++ b/Papers/WWW'15 - Automatic Validation, Correction and Generation of Dataset Metadata - Enhancing Dataset Search and Spam Detection/poster/www15-poster.pptx
@@ -305,7 +305,7 @@
             <a:fld id="{AB3B3CD4-9605-4B16-ADF1-526C2BC53AE0}" type="datetimeFigureOut">
               <a:rPr lang="en-US" smtClean="0"/>
               <a:pPr/>
-              <a:t>5/11/15</a:t>
+              <a:t>5/12/15</a:t>
             </a:fld>
             <a:endParaRPr lang="en-US" dirty="0"/>
           </a:p>
@@ -477,7 +477,7 @@
             <a:fld id="{AB3B3CD4-9605-4B16-ADF1-526C2BC53AE0}" type="datetimeFigureOut">
               <a:rPr lang="en-US" smtClean="0"/>
               <a:pPr/>
-              <a:t>5/11/15</a:t>
+              <a:t>5/12/15</a:t>
             </a:fld>
             <a:endParaRPr lang="en-US" dirty="0"/>
           </a:p>
@@ -659,7 +659,7 @@
             <a:fld id="{AB3B3CD4-9605-4B16-ADF1-526C2BC53AE0}" type="datetimeFigureOut">
               <a:rPr lang="en-US" smtClean="0"/>
               <a:pPr/>
-              <a:t>5/11/15</a:t>
+              <a:t>5/12/15</a:t>
             </a:fld>
             <a:endParaRPr lang="en-US" dirty="0"/>
           </a:p>
@@ -831,7 +831,7 @@
             <a:fld id="{AB3B3CD4-9605-4B16-ADF1-526C2BC53AE0}" type="datetimeFigureOut">
               <a:rPr lang="en-US" smtClean="0"/>
               <a:pPr/>
-              <a:t>5/11/15</a:t>
+              <a:t>5/12/15</a:t>
             </a:fld>
             <a:endParaRPr lang="en-US" dirty="0"/>
           </a:p>
@@ -1079,7 +1079,7 @@
             <a:fld id="{AB3B3CD4-9605-4B16-ADF1-526C2BC53AE0}" type="datetimeFigureOut">
               <a:rPr lang="en-US" smtClean="0"/>
               <a:pPr/>
-              <a:t>5/11/15</a:t>
+              <a:t>5/12/15</a:t>
             </a:fld>
             <a:endParaRPr lang="en-US" dirty="0"/>
           </a:p>
@@ -1369,7 +1369,7 @@
             <a:fld id="{AB3B3CD4-9605-4B16-ADF1-526C2BC53AE0}" type="datetimeFigureOut">
               <a:rPr lang="en-US" smtClean="0"/>
               <a:pPr/>
-              <a:t>5/11/15</a:t>
+              <a:t>5/12/15</a:t>
             </a:fld>
             <a:endParaRPr lang="en-US" dirty="0"/>
           </a:p>
@@ -1798,7 +1798,7 @@
             <a:fld id="{AB3B3CD4-9605-4B16-ADF1-526C2BC53AE0}" type="datetimeFigureOut">
               <a:rPr lang="en-US" smtClean="0"/>
               <a:pPr/>
-              <a:t>5/11/15</a:t>
+              <a:t>5/12/15</a:t>
             </a:fld>
             <a:endParaRPr lang="en-US" dirty="0"/>
           </a:p>
@@ -1918,7 +1918,7 @@
             <a:fld id="{AB3B3CD4-9605-4B16-ADF1-526C2BC53AE0}" type="datetimeFigureOut">
               <a:rPr lang="en-US" smtClean="0"/>
               <a:pPr/>
-              <a:t>5/11/15</a:t>
+              <a:t>5/12/15</a:t>
             </a:fld>
             <a:endParaRPr lang="en-US" dirty="0"/>
           </a:p>
@@ -2015,7 +2015,7 @@
             <a:fld id="{AB3B3CD4-9605-4B16-ADF1-526C2BC53AE0}" type="datetimeFigureOut">
               <a:rPr lang="en-US" smtClean="0"/>
               <a:pPr/>
-              <a:t>5/11/15</a:t>
+              <a:t>5/12/15</a:t>
             </a:fld>
             <a:endParaRPr lang="en-US" dirty="0"/>
           </a:p>
@@ -2294,7 +2294,7 @@
             <a:fld id="{AB3B3CD4-9605-4B16-ADF1-526C2BC53AE0}" type="datetimeFigureOut">
               <a:rPr lang="en-US" smtClean="0"/>
               <a:pPr/>
-              <a:t>5/11/15</a:t>
+              <a:t>5/12/15</a:t>
             </a:fld>
             <a:endParaRPr lang="en-US" dirty="0"/>
           </a:p>
@@ -2549,7 +2549,7 @@
             <a:fld id="{AB3B3CD4-9605-4B16-ADF1-526C2BC53AE0}" type="datetimeFigureOut">
               <a:rPr lang="en-US" smtClean="0"/>
               <a:pPr/>
-              <a:t>5/11/15</a:t>
+              <a:t>5/12/15</a:t>
             </a:fld>
             <a:endParaRPr lang="en-US" dirty="0"/>
           </a:p>
@@ -2764,7 +2764,7 @@
             <a:fld id="{AB3B3CD4-9605-4B16-ADF1-526C2BC53AE0}" type="datetimeFigureOut">
               <a:rPr lang="en-US" smtClean="0"/>
               <a:pPr/>
-              <a:t>5/11/15</a:t>
+              <a:t>5/12/15</a:t>
             </a:fld>
             <a:endParaRPr lang="en-US" dirty="0"/>
           </a:p>
@@ -3190,13 +3190,10 @@
           <a:p>
             <a:pPr algn="ctr"/>
             <a:r>
-              <a:rPr lang="en-US" sz="3600" dirty="0" err="1"/>
-              <a:t>ahmad.assaf@sap.com</a:t>
-            </a:r>
-            <a:r>
-              <a:rPr lang="en-US" sz="3600" dirty="0"/>
-              <a:t> </a:t>
-            </a:r>
+              <a:rPr lang="en-US" sz="3600" dirty="0" err="1" smtClean="0"/>
+              <a:t>Aline.senart@sap.com</a:t>
+            </a:r>
+            <a:endParaRPr lang="en-US" sz="3600" dirty="0"/>
           </a:p>
         </p:txBody>
       </p:sp>
@@ -3252,20 +3249,17 @@
           </a:bodyPr>
           <a:lstStyle/>
           <a:p>
-            <a:pPr algn="ctr"/>
-            <a:r>
-              <a:rPr lang="en-US" sz="8000" dirty="0" smtClean="0"/>
+            <a:r>
+              <a:rPr lang="en-US" sz="8000" b="1" dirty="0" smtClean="0"/>
               <a:t>Roomba</a:t>
             </a:r>
-            <a:endParaRPr lang="en-US" sz="6600" dirty="0" smtClean="0"/>
-          </a:p>
-          <a:p>
-            <a:pPr algn="ctr"/>
+            <a:endParaRPr lang="en-US" sz="6600" b="1" dirty="0" smtClean="0"/>
+          </a:p>
+          <a:p>
             <a:r>
               <a:rPr lang="en-US" sz="6600" dirty="0"/>
               <a:t>Automatic Validation, Correction and Generation of Dataset Metadata - Enhancing Dataset Search and Spam Detection</a:t>
             </a:r>
-            <a:endParaRPr lang="en-US" sz="6600" dirty="0"/>
           </a:p>
         </p:txBody>
       </p:sp>
@@ -3356,11 +3350,7 @@
             </a:r>
             <a:r>
               <a:rPr lang="en-US" sz="4800" dirty="0" smtClean="0"/>
-              <a:t> </a:t>
-            </a:r>
-            <a:r>
-              <a:rPr lang="en-US" sz="4800" dirty="0" smtClean="0"/>
-              <a:t>and </a:t>
+              <a:t> and </a:t>
             </a:r>
             <a:r>
               <a:rPr lang="fr-FR" sz="4800" dirty="0" smtClean="0"/>
@@ -3461,7 +3451,7 @@
         </p:blipFill>
         <p:spPr bwMode="auto">
           <a:xfrm>
-            <a:off x="25617054" y="2696949"/>
+            <a:off x="25244568" y="39060165"/>
             <a:ext cx="3538721" cy="3538721"/>
           </a:xfrm>
           <a:prstGeom prst="rect">
@@ -3487,8 +3477,8 @@
         </p:nvSpPr>
         <p:spPr>
           <a:xfrm>
-            <a:off x="1003891" y="41895349"/>
-            <a:ext cx="28576183" cy="769441"/>
+            <a:off x="1050089" y="39678597"/>
+            <a:ext cx="28576183" cy="707886"/>
           </a:xfrm>
           <a:prstGeom prst="rect">
             <a:avLst/>
@@ -3502,58 +3492,81 @@
           <a:lstStyle/>
           <a:p>
             <a:r>
-              <a:rPr lang="en-US" sz="4400" b="1" dirty="0" smtClean="0"/>
-              <a:t>All </a:t>
-            </a:r>
-            <a:r>
-              <a:rPr lang="en-US" sz="4400" b="1" dirty="0" smtClean="0"/>
-              <a:t>results are reproducible from our code base at </a:t>
-            </a:r>
-            <a:r>
-              <a:rPr lang="en-US" sz="4400" b="1" dirty="0">
+              <a:rPr lang="en-US" sz="4000" dirty="0" smtClean="0">
+                <a:latin typeface="NanumMyeongjo" charset="-127"/>
+                <a:ea typeface="NanumMyeongjo" charset="-127"/>
+                <a:cs typeface="NanumMyeongjo" charset="-127"/>
+              </a:rPr>
+              <a:t>All results are reproducible from our code base at </a:t>
+            </a:r>
+            <a:r>
+              <a:rPr lang="en-US" sz="4000" b="1" dirty="0">
                 <a:solidFill>
                   <a:srgbClr val="3799F3"/>
                 </a:solidFill>
+                <a:latin typeface="NanumMyeongjo" charset="-127"/>
+                <a:ea typeface="NanumMyeongjo" charset="-127"/>
+                <a:cs typeface="NanumMyeongjo" charset="-127"/>
               </a:rPr>
               <a:t>https://github.com/</a:t>
             </a:r>
             <a:r>
-              <a:rPr lang="en-US" sz="4400" b="1" dirty="0" err="1">
+              <a:rPr lang="en-US" sz="4000" b="1" dirty="0" err="1">
                 <a:solidFill>
                   <a:srgbClr val="3799F3"/>
                 </a:solidFill>
+                <a:latin typeface="NanumMyeongjo" charset="-127"/>
+                <a:ea typeface="NanumMyeongjo" charset="-127"/>
+                <a:cs typeface="NanumMyeongjo" charset="-127"/>
               </a:rPr>
               <a:t>ahmadassaf</a:t>
             </a:r>
             <a:r>
-              <a:rPr lang="en-US" sz="4400" b="1" dirty="0">
+              <a:rPr lang="en-US" sz="4000" b="1" dirty="0">
                 <a:solidFill>
                   <a:srgbClr val="3799F3"/>
                 </a:solidFill>
+                <a:latin typeface="NanumMyeongjo" charset="-127"/>
+                <a:ea typeface="NanumMyeongjo" charset="-127"/>
+                <a:cs typeface="NanumMyeongjo" charset="-127"/>
               </a:rPr>
               <a:t>/</a:t>
             </a:r>
             <a:r>
-              <a:rPr lang="en-US" sz="4400" b="1" dirty="0" err="1">
+              <a:rPr lang="en-US" sz="4000" b="1" dirty="0" err="1">
                 <a:solidFill>
                   <a:srgbClr val="3799F3"/>
                 </a:solidFill>
+                <a:latin typeface="NanumMyeongjo" charset="-127"/>
+                <a:ea typeface="NanumMyeongjo" charset="-127"/>
+                <a:cs typeface="NanumMyeongjo" charset="-127"/>
               </a:rPr>
               <a:t>opendata</a:t>
             </a:r>
             <a:r>
-              <a:rPr lang="en-US" sz="4400" b="1" dirty="0">
+              <a:rPr lang="en-US" sz="4000" b="1" dirty="0">
                 <a:solidFill>
                   <a:srgbClr val="3799F3"/>
                 </a:solidFill>
+                <a:latin typeface="NanumMyeongjo" charset="-127"/>
+                <a:ea typeface="NanumMyeongjo" charset="-127"/>
+                <a:cs typeface="NanumMyeongjo" charset="-127"/>
               </a:rPr>
               <a:t>-checker</a:t>
             </a:r>
             <a:r>
-              <a:rPr lang="en-US" sz="4400" b="1" dirty="0"/>
+              <a:rPr lang="en-US" sz="4000" b="1" dirty="0">
+                <a:latin typeface="NanumMyeongjo" charset="-127"/>
+                <a:ea typeface="NanumMyeongjo" charset="-127"/>
+                <a:cs typeface="NanumMyeongjo" charset="-127"/>
+              </a:rPr>
               <a:t> </a:t>
             </a:r>
-            <a:endParaRPr lang="en-US" sz="4400" b="1" dirty="0" smtClean="0"/>
+            <a:endParaRPr lang="en-US" sz="4000" b="1" dirty="0" smtClean="0">
+              <a:latin typeface="NanumMyeongjo" charset="-127"/>
+              <a:ea typeface="NanumMyeongjo" charset="-127"/>
+              <a:cs typeface="NanumMyeongjo" charset="-127"/>
+            </a:endParaRPr>
           </a:p>
         </p:txBody>
       </p:sp>
@@ -3579,7 +3592,7 @@
         </p:blipFill>
         <p:spPr>
           <a:xfrm>
-            <a:off x="4063877" y="8077201"/>
+            <a:off x="3364617" y="17839632"/>
             <a:ext cx="21394304" cy="9175675"/>
           </a:xfrm>
           <a:prstGeom prst="rect">
@@ -3587,453 +3600,6 @@
           </a:prstGeom>
         </p:spPr>
       </p:pic>
-      <p:sp>
-        <p:nvSpPr>
-          <p:cNvPr id="70" name="TextBox 69"/>
-          <p:cNvSpPr txBox="1"/>
-          <p:nvPr/>
-        </p:nvSpPr>
-        <p:spPr>
-          <a:xfrm>
-            <a:off x="4063877" y="17862476"/>
-            <a:ext cx="16383000" cy="5724644"/>
-          </a:xfrm>
-          <a:prstGeom prst="rect">
-            <a:avLst/>
-          </a:prstGeom>
-          <a:noFill/>
-        </p:spPr>
-        <p:txBody>
-          <a:bodyPr wrap="square" rtlCol="0">
-            <a:spAutoFit/>
-          </a:bodyPr>
-          <a:lstStyle/>
-          <a:p>
-            <a:pPr>
-              <a:lnSpc>
-                <a:spcPct val="150000"/>
-              </a:lnSpc>
-            </a:pPr>
-            <a:r>
-              <a:rPr lang="en-US" sz="4800" b="1" dirty="0" smtClean="0">
-                <a:solidFill>
-                  <a:srgbClr val="3799F3"/>
-                </a:solidFill>
-              </a:rPr>
-              <a:t>With Roomba, you can</a:t>
-            </a:r>
-          </a:p>
-          <a:p>
-            <a:pPr>
-              <a:lnSpc>
-                <a:spcPct val="150000"/>
-              </a:lnSpc>
-            </a:pPr>
-            <a:endParaRPr lang="en-US" sz="3600" b="1" dirty="0" smtClean="0"/>
-          </a:p>
-          <a:p>
-            <a:pPr marL="457200" indent="-457200">
-              <a:lnSpc>
-                <a:spcPct val="150000"/>
-              </a:lnSpc>
-              <a:buFont typeface="Wingdings" charset="2"/>
-              <a:buChar char="§"/>
-            </a:pPr>
-            <a:r>
-              <a:rPr lang="en-US" sz="3200" b="1" dirty="0" smtClean="0"/>
-              <a:t>Fetch </a:t>
-            </a:r>
-            <a:r>
-              <a:rPr lang="en-US" sz="3200" b="1" dirty="0"/>
-              <a:t>all the information about datasets from a data </a:t>
-            </a:r>
-            <a:r>
-              <a:rPr lang="en-US" sz="3200" b="1" dirty="0" smtClean="0"/>
-              <a:t>portal</a:t>
-            </a:r>
-          </a:p>
-          <a:p>
-            <a:pPr marL="457200" indent="-457200">
-              <a:lnSpc>
-                <a:spcPct val="150000"/>
-              </a:lnSpc>
-              <a:buFont typeface="Wingdings" charset="2"/>
-              <a:buChar char="§"/>
-            </a:pPr>
-            <a:r>
-              <a:rPr lang="en-US" sz="3200" b="1" dirty="0" smtClean="0"/>
-              <a:t>Fetch </a:t>
-            </a:r>
-            <a:r>
-              <a:rPr lang="en-US" sz="3200" b="1" dirty="0"/>
-              <a:t>all the groups information from a data </a:t>
-            </a:r>
-            <a:r>
-              <a:rPr lang="en-US" sz="3200" b="1" dirty="0" smtClean="0"/>
-              <a:t>portal</a:t>
-            </a:r>
-          </a:p>
-          <a:p>
-            <a:pPr marL="457200" indent="-457200">
-              <a:lnSpc>
-                <a:spcPct val="150000"/>
-              </a:lnSpc>
-              <a:buFont typeface="Wingdings" charset="2"/>
-              <a:buChar char="§"/>
-            </a:pPr>
-            <a:r>
-              <a:rPr lang="en-US" sz="3200" b="1" dirty="0" smtClean="0"/>
-              <a:t>Crawl </a:t>
-            </a:r>
-            <a:r>
-              <a:rPr lang="en-US" sz="3200" b="1" dirty="0"/>
-              <a:t>datasets (a specific dataset, datasets in a specific group, datasets in the whole portal</a:t>
-            </a:r>
-            <a:r>
-              <a:rPr lang="en-US" sz="3200" b="1" dirty="0" smtClean="0"/>
-              <a:t>)</a:t>
-            </a:r>
-          </a:p>
-          <a:p>
-            <a:pPr marL="457200" indent="-457200">
-              <a:lnSpc>
-                <a:spcPct val="150000"/>
-              </a:lnSpc>
-              <a:buFont typeface="Wingdings" charset="2"/>
-              <a:buChar char="§"/>
-            </a:pPr>
-            <a:r>
-              <a:rPr lang="en-US" sz="3200" b="1" dirty="0" smtClean="0"/>
-              <a:t>Execute </a:t>
-            </a:r>
-            <a:r>
-              <a:rPr lang="en-US" sz="3200" b="1" dirty="0"/>
-              <a:t>aggregation report on a specific group or on the whole data </a:t>
-            </a:r>
-            <a:r>
-              <a:rPr lang="en-US" sz="3200" b="1" dirty="0" smtClean="0"/>
-              <a:t>portal</a:t>
-            </a:r>
-          </a:p>
-          <a:p>
-            <a:pPr marL="457200" indent="-457200">
-              <a:lnSpc>
-                <a:spcPct val="150000"/>
-              </a:lnSpc>
-              <a:buFont typeface="Wingdings" charset="2"/>
-              <a:buChar char="§"/>
-            </a:pPr>
-            <a:r>
-              <a:rPr lang="en-US" sz="3200" b="1" dirty="0" smtClean="0"/>
-              <a:t>Profile </a:t>
-            </a:r>
-            <a:r>
-              <a:rPr lang="en-US" sz="3200" b="1" dirty="0"/>
-              <a:t>a specific dataset, a whole group or the whole data portal</a:t>
-            </a:r>
-            <a:endParaRPr lang="en-US" sz="3200" dirty="0"/>
-          </a:p>
-        </p:txBody>
-      </p:sp>
-      <p:grpSp>
-        <p:nvGrpSpPr>
-          <p:cNvPr id="22" name="Group 21"/>
-          <p:cNvGrpSpPr/>
-          <p:nvPr/>
-        </p:nvGrpSpPr>
-        <p:grpSpPr>
-          <a:xfrm>
-            <a:off x="703489" y="33506444"/>
-            <a:ext cx="28115079" cy="8086295"/>
-            <a:chOff x="793750" y="24706841"/>
-            <a:chExt cx="28115079" cy="8086295"/>
-          </a:xfrm>
-        </p:grpSpPr>
-        <p:sp>
-          <p:nvSpPr>
-            <p:cNvPr id="16" name="TextBox 15"/>
-            <p:cNvSpPr txBox="1"/>
-            <p:nvPr/>
-          </p:nvSpPr>
-          <p:spPr>
-            <a:xfrm>
-              <a:off x="793750" y="26052829"/>
-              <a:ext cx="12496800" cy="6740307"/>
-            </a:xfrm>
-            <a:prstGeom prst="rect">
-              <a:avLst/>
-            </a:prstGeom>
-            <a:noFill/>
-          </p:spPr>
-          <p:txBody>
-            <a:bodyPr wrap="square" rtlCol="0">
-              <a:spAutoFit/>
-            </a:bodyPr>
-            <a:lstStyle/>
-            <a:p>
-              <a:pPr marL="457200" indent="-457200">
-                <a:lnSpc>
-                  <a:spcPct val="150000"/>
-                </a:lnSpc>
-                <a:buFont typeface="Wingdings" charset="2"/>
-                <a:buChar char="§"/>
-              </a:pPr>
-              <a:r>
-                <a:rPr lang="en-US" sz="3200" b="1" dirty="0"/>
-                <a:t>URL inspection</a:t>
-              </a:r>
-              <a:r>
-                <a:rPr lang="en-US" sz="3200" dirty="0"/>
-                <a:t>: Check the existence of certain URL patterns.</a:t>
-              </a:r>
-            </a:p>
-            <a:p>
-              <a:pPr marL="457200" indent="-457200">
-                <a:lnSpc>
-                  <a:spcPct val="150000"/>
-                </a:lnSpc>
-                <a:buFont typeface="Wingdings" charset="2"/>
-                <a:buChar char="§"/>
-              </a:pPr>
-              <a:r>
-                <a:rPr lang="en-US" sz="3200" b="1" dirty="0"/>
-                <a:t>Meta tags inspection</a:t>
-              </a:r>
-              <a:r>
-                <a:rPr lang="en-US" sz="3200" dirty="0"/>
-                <a:t>: For example, meta[content*="</a:t>
-              </a:r>
-              <a:r>
-                <a:rPr lang="en-US" sz="3200" dirty="0" err="1"/>
-                <a:t>ckan</a:t>
-              </a:r>
-              <a:r>
-                <a:rPr lang="en-US" sz="3200" dirty="0"/>
-                <a:t>] (all meta tags with the attribute content containing the string CKAN). This selector can identify CKAN portals whereas </a:t>
-              </a:r>
-              <a:r>
-                <a:rPr lang="en-US" sz="3200" dirty="0" smtClean="0"/>
-                <a:t>the meta[content</a:t>
-              </a:r>
-              <a:r>
-                <a:rPr lang="en-US" sz="3200" dirty="0"/>
-                <a:t>*="Drupal"] can identify DKAN portals.</a:t>
-              </a:r>
-            </a:p>
-            <a:p>
-              <a:pPr marL="457200" indent="-457200">
-                <a:lnSpc>
-                  <a:spcPct val="150000"/>
-                </a:lnSpc>
-                <a:buFont typeface="Wingdings" charset="2"/>
-                <a:buChar char="§"/>
-              </a:pPr>
-              <a:r>
-                <a:rPr lang="en-US" sz="3200" b="1" dirty="0"/>
-                <a:t>Document Object Model (DOM) inspection</a:t>
-              </a:r>
-              <a:r>
-                <a:rPr lang="en-US" sz="3200" dirty="0"/>
-                <a:t>: Similar to the meta tags inspection, we check the existence of certain DOM elements or properties.</a:t>
-              </a:r>
-            </a:p>
-            <a:p>
-              <a:pPr>
-                <a:lnSpc>
-                  <a:spcPct val="150000"/>
-                </a:lnSpc>
-              </a:pPr>
-              <a:endParaRPr lang="en-US" sz="3200" dirty="0"/>
-            </a:p>
-          </p:txBody>
-        </p:sp>
-        <p:sp>
-          <p:nvSpPr>
-            <p:cNvPr id="71" name="TextBox 70"/>
-            <p:cNvSpPr txBox="1"/>
-            <p:nvPr/>
-          </p:nvSpPr>
-          <p:spPr>
-            <a:xfrm>
-              <a:off x="16412029" y="26052829"/>
-              <a:ext cx="12496800" cy="6001643"/>
-            </a:xfrm>
-            <a:prstGeom prst="rect">
-              <a:avLst/>
-            </a:prstGeom>
-            <a:noFill/>
-          </p:spPr>
-          <p:txBody>
-            <a:bodyPr wrap="square" rtlCol="0">
-              <a:spAutoFit/>
-            </a:bodyPr>
-            <a:lstStyle/>
-            <a:p>
-              <a:pPr marL="457200" indent="-457200">
-                <a:lnSpc>
-                  <a:spcPct val="150000"/>
-                </a:lnSpc>
-                <a:buFont typeface="Wingdings" charset="2"/>
-                <a:buChar char="§"/>
-              </a:pPr>
-              <a:r>
-                <a:rPr lang="en-US" sz="3200" b="1" dirty="0"/>
-                <a:t>meta-field values report</a:t>
-              </a:r>
-              <a:r>
-                <a:rPr lang="en-US" sz="3200" dirty="0"/>
-                <a:t>: Aggregate all the values of a certain key e.g. </a:t>
-              </a:r>
-              <a:r>
-                <a:rPr lang="en-US" sz="3200" dirty="0" err="1"/>
-                <a:t>license_title</a:t>
-              </a:r>
-              <a:r>
-                <a:rPr lang="en-US" sz="3200" dirty="0"/>
-                <a:t> will aggregate all the licenses </a:t>
-              </a:r>
-              <a:r>
-                <a:rPr lang="en-US" sz="3200" dirty="0" smtClean="0"/>
-                <a:t>titles</a:t>
-              </a:r>
-            </a:p>
-            <a:p>
-              <a:pPr marL="457200" indent="-457200">
-                <a:lnSpc>
-                  <a:spcPct val="150000"/>
-                </a:lnSpc>
-                <a:buFont typeface="Wingdings" charset="2"/>
-                <a:buChar char="§"/>
-              </a:pPr>
-              <a:r>
-                <a:rPr lang="en-US" sz="3200" b="1" dirty="0" err="1" smtClean="0"/>
-                <a:t>key:object</a:t>
-              </a:r>
-              <a:r>
-                <a:rPr lang="en-US" sz="3200" b="1" dirty="0" smtClean="0"/>
-                <a:t> </a:t>
-              </a:r>
-              <a:r>
-                <a:rPr lang="en-US" sz="3200" b="1" dirty="0"/>
-                <a:t>meta-field values report</a:t>
-              </a:r>
-              <a:r>
-                <a:rPr lang="en-US" sz="3200" dirty="0"/>
-                <a:t>: Aggregate all the values of a certain key with an aggregate of another field as its object. e.g. </a:t>
-              </a:r>
-              <a:r>
-                <a:rPr lang="en-US" sz="3200" dirty="0" err="1"/>
-                <a:t>license_title:title</a:t>
-              </a:r>
-              <a:r>
-                <a:rPr lang="en-US" sz="3200" dirty="0"/>
-                <a:t> will aggregate all the license titles used and also will aggregate all the titles for all the datasets using that license </a:t>
-              </a:r>
-              <a:r>
-                <a:rPr lang="en-US" sz="3200" dirty="0" smtClean="0"/>
-                <a:t>title</a:t>
-              </a:r>
-            </a:p>
-            <a:p>
-              <a:pPr marL="457200" indent="-457200">
-                <a:lnSpc>
-                  <a:spcPct val="150000"/>
-                </a:lnSpc>
-                <a:buFont typeface="Wingdings" charset="2"/>
-                <a:buChar char="§"/>
-              </a:pPr>
-              <a:r>
-                <a:rPr lang="en-US" sz="3200" b="1" dirty="0" smtClean="0"/>
-                <a:t>Check </a:t>
-              </a:r>
-              <a:r>
-                <a:rPr lang="en-US" sz="3200" b="1" dirty="0"/>
-                <a:t>Empty field values report</a:t>
-              </a:r>
-              <a:r>
-                <a:rPr lang="en-US" sz="3200" dirty="0"/>
-                <a:t>: Check all the datasets containing an empty value of the passed field key</a:t>
-              </a:r>
-            </a:p>
-          </p:txBody>
-        </p:sp>
-        <p:sp>
-          <p:nvSpPr>
-            <p:cNvPr id="17" name="TextBox 16"/>
-            <p:cNvSpPr txBox="1"/>
-            <p:nvPr/>
-          </p:nvSpPr>
-          <p:spPr>
-            <a:xfrm>
-              <a:off x="19476811" y="24706841"/>
-              <a:ext cx="5420266" cy="923330"/>
-            </a:xfrm>
-            <a:prstGeom prst="rect">
-              <a:avLst/>
-            </a:prstGeom>
-            <a:noFill/>
-          </p:spPr>
-          <p:txBody>
-            <a:bodyPr wrap="none" rtlCol="0">
-              <a:spAutoFit/>
-            </a:bodyPr>
-            <a:lstStyle/>
-            <a:p>
-              <a:r>
-                <a:rPr lang="en-US" sz="5400" dirty="0" smtClean="0">
-                  <a:solidFill>
-                    <a:srgbClr val="3799F3"/>
-                  </a:solidFill>
-                </a:rPr>
-                <a:t>Report Generation</a:t>
-              </a:r>
-              <a:endParaRPr lang="en-US" sz="5400" dirty="0">
-                <a:solidFill>
-                  <a:srgbClr val="3799F3"/>
-                </a:solidFill>
-              </a:endParaRPr>
-            </a:p>
-          </p:txBody>
-        </p:sp>
-        <p:sp>
-          <p:nvSpPr>
-            <p:cNvPr id="75" name="TextBox 74"/>
-            <p:cNvSpPr txBox="1"/>
-            <p:nvPr/>
-          </p:nvSpPr>
-          <p:spPr>
-            <a:xfrm>
-              <a:off x="2484211" y="24706841"/>
-              <a:ext cx="6404446" cy="923330"/>
-            </a:xfrm>
-            <a:prstGeom prst="rect">
-              <a:avLst/>
-            </a:prstGeom>
-            <a:noFill/>
-          </p:spPr>
-          <p:txBody>
-            <a:bodyPr wrap="none" rtlCol="0">
-              <a:spAutoFit/>
-            </a:bodyPr>
-            <a:lstStyle/>
-            <a:p>
-              <a:r>
-                <a:rPr lang="en-US" sz="5400" dirty="0" smtClean="0">
-                  <a:solidFill>
-                    <a:srgbClr val="3799F3"/>
-                  </a:solidFill>
-                </a:rPr>
-                <a:t>Data Portal Inspection</a:t>
-              </a:r>
-              <a:endParaRPr lang="en-US" sz="5400" dirty="0">
-                <a:solidFill>
-                  <a:srgbClr val="3799F3"/>
-                </a:solidFill>
-              </a:endParaRPr>
-            </a:p>
-          </p:txBody>
-        </p:sp>
-      </p:grpSp>
       <p:sp>
         <p:nvSpPr>
           <p:cNvPr id="23" name="TextBox 22"/>
@@ -4068,7 +3634,7 @@
         </p:nvSpPr>
         <p:spPr>
           <a:xfrm>
-            <a:off x="793750" y="25134503"/>
+            <a:off x="793750" y="30477850"/>
             <a:ext cx="28024818" cy="7571303"/>
           </a:xfrm>
           <a:prstGeom prst="rect">
@@ -4329,20 +3895,43 @@
               <a:rPr lang="en-US" sz="3600" dirty="0"/>
               <a:t>up and tracked.</a:t>
             </a:r>
-            <a:endParaRPr lang="en-US" sz="3600" dirty="0"/>
-          </a:p>
-        </p:txBody>
-      </p:sp>
-      <p:sp>
-        <p:nvSpPr>
-          <p:cNvPr id="86" name="TextBox 85"/>
+          </a:p>
+        </p:txBody>
+      </p:sp>
+      <p:pic>
+        <p:nvPicPr>
+          <p:cNvPr id="3" name="Picture 2"/>
+          <p:cNvPicPr>
+            <a:picLocks noChangeAspect="1"/>
+          </p:cNvPicPr>
+          <p:nvPr/>
+        </p:nvPicPr>
+        <p:blipFill>
+          <a:blip r:embed="rId5"/>
+          <a:stretch>
+            <a:fillRect/>
+          </a:stretch>
+        </p:blipFill>
+        <p:spPr>
+          <a:xfrm>
+            <a:off x="567442" y="7860098"/>
+            <a:ext cx="5659187" cy="5659187"/>
+          </a:xfrm>
+          <a:prstGeom prst="rect">
+            <a:avLst/>
+          </a:prstGeom>
+        </p:spPr>
+      </p:pic>
+      <p:sp>
+        <p:nvSpPr>
+          <p:cNvPr id="5" name="TextBox 4"/>
           <p:cNvSpPr txBox="1"/>
           <p:nvPr/>
         </p:nvSpPr>
         <p:spPr>
           <a:xfrm>
-            <a:off x="723207" y="24007396"/>
-            <a:ext cx="8173135" cy="923330"/>
+            <a:off x="6813550" y="7860098"/>
+            <a:ext cx="8901370" cy="6001643"/>
           </a:xfrm>
           <a:prstGeom prst="rect">
             <a:avLst/>
@@ -4350,27 +3939,226 @@
           <a:noFill/>
         </p:spPr>
         <p:txBody>
-          <a:bodyPr wrap="none" rtlCol="0">
+          <a:bodyPr wrap="square" rtlCol="0">
             <a:spAutoFit/>
           </a:bodyPr>
           <a:lstStyle/>
           <a:p>
             <a:r>
-              <a:rPr lang="en-US" sz="5400" dirty="0" smtClean="0">
+              <a:rPr lang="en-US" sz="6000" dirty="0" smtClean="0">
                 <a:solidFill>
-                  <a:srgbClr val="3799F3"/>
+                  <a:srgbClr val="C00000"/>
                 </a:solidFill>
               </a:rPr>
-              <a:t>Metadata Information Types</a:t>
-            </a:r>
-            <a:endParaRPr lang="en-US" sz="5400" dirty="0">
+              <a:t>Data Portals</a:t>
+            </a:r>
+          </a:p>
+          <a:p>
+            <a:endParaRPr lang="en-US" sz="6000" dirty="0" smtClean="0">
               <a:solidFill>
-                <a:srgbClr val="3799F3"/>
+                <a:srgbClr val="C00000"/>
               </a:solidFill>
             </a:endParaRPr>
           </a:p>
-        </p:txBody>
-      </p:sp>
+          <a:p>
+            <a:r>
+              <a:rPr lang="en-US" sz="4400" dirty="0" smtClean="0"/>
+              <a:t>A </a:t>
+            </a:r>
+            <a:r>
+              <a:rPr lang="en-US" sz="4400" dirty="0"/>
+              <a:t>curated collection of metadata about data </a:t>
+            </a:r>
+            <a:r>
+              <a:rPr lang="en-US" sz="4400" dirty="0" smtClean="0"/>
+              <a:t>sets providing discovery </a:t>
+            </a:r>
+            <a:r>
+              <a:rPr lang="en-US" sz="4400" dirty="0"/>
+              <a:t>functionality to complement conventional browse-style catalogue interfaces 	</a:t>
+            </a:r>
+          </a:p>
+          <a:p>
+            <a:r>
+              <a:rPr lang="en-US" sz="4400" dirty="0" smtClean="0"/>
+              <a:t> </a:t>
+            </a:r>
+            <a:r>
+              <a:rPr lang="en-US" sz="4400" dirty="0"/>
+              <a:t>	</a:t>
+            </a:r>
+          </a:p>
+        </p:txBody>
+      </p:sp>
+      <p:cxnSp>
+        <p:nvCxnSpPr>
+          <p:cNvPr id="25" name="Straight Connector 24"/>
+          <p:cNvCxnSpPr/>
+          <p:nvPr/>
+        </p:nvCxnSpPr>
+        <p:spPr>
+          <a:xfrm flipH="1">
+            <a:off x="587829" y="14706600"/>
+            <a:ext cx="28346400" cy="0"/>
+          </a:xfrm>
+          <a:prstGeom prst="line">
+            <a:avLst/>
+          </a:prstGeom>
+        </p:spPr>
+        <p:style>
+          <a:lnRef idx="1">
+            <a:schemeClr val="dk1"/>
+          </a:lnRef>
+          <a:fillRef idx="0">
+            <a:schemeClr val="dk1"/>
+          </a:fillRef>
+          <a:effectRef idx="0">
+            <a:schemeClr val="dk1"/>
+          </a:effectRef>
+          <a:fontRef idx="minor">
+            <a:schemeClr val="tx1"/>
+          </a:fontRef>
+        </p:style>
+      </p:cxnSp>
+      <p:pic>
+        <p:nvPicPr>
+          <p:cNvPr id="8" name="Picture 7" descr="Screen Shot 2015-05-12 at 18.15.11.png"/>
+          <p:cNvPicPr>
+            <a:picLocks noChangeAspect="1"/>
+          </p:cNvPicPr>
+          <p:nvPr/>
+        </p:nvPicPr>
+        <p:blipFill>
+          <a:blip r:embed="rId6">
+            <a:extLst>
+              <a:ext uri="{28A0092B-C50C-407E-A947-70E740481C1C}">
+                <a14:useLocalDpi xmlns:a14="http://schemas.microsoft.com/office/drawing/2010/main" val="0"/>
+              </a:ext>
+            </a:extLst>
+          </a:blip>
+          <a:stretch>
+            <a:fillRect/>
+          </a:stretch>
+        </p:blipFill>
+        <p:spPr>
+          <a:xfrm>
+            <a:off x="25671789" y="2907784"/>
+            <a:ext cx="3111500" cy="1930400"/>
+          </a:xfrm>
+          <a:prstGeom prst="rect">
+            <a:avLst/>
+          </a:prstGeom>
+        </p:spPr>
+      </p:pic>
+      <p:pic>
+        <p:nvPicPr>
+          <p:cNvPr id="10" name="Picture 9" descr="Screen Shot 2015-05-12 at 18.24.04.png"/>
+          <p:cNvPicPr>
+            <a:picLocks noChangeAspect="1"/>
+          </p:cNvPicPr>
+          <p:nvPr/>
+        </p:nvPicPr>
+        <p:blipFill>
+          <a:blip r:embed="rId7">
+            <a:extLst>
+              <a:ext uri="{28A0092B-C50C-407E-A947-70E740481C1C}">
+                <a14:useLocalDpi xmlns:a14="http://schemas.microsoft.com/office/drawing/2010/main" val="0"/>
+              </a:ext>
+            </a:extLst>
+          </a:blip>
+          <a:stretch>
+            <a:fillRect/>
+          </a:stretch>
+        </p:blipFill>
+        <p:spPr>
+          <a:xfrm>
+            <a:off x="10925629" y="13335000"/>
+            <a:ext cx="6426200" cy="3886200"/>
+          </a:xfrm>
+          <a:prstGeom prst="rect">
+            <a:avLst/>
+          </a:prstGeom>
+        </p:spPr>
+      </p:pic>
+      <p:sp>
+        <p:nvSpPr>
+          <p:cNvPr id="15" name="TextBox 14"/>
+          <p:cNvSpPr txBox="1"/>
+          <p:nvPr/>
+        </p:nvSpPr>
+        <p:spPr>
+          <a:xfrm>
+            <a:off x="1046079" y="40829526"/>
+            <a:ext cx="22607671" cy="1323439"/>
+          </a:xfrm>
+          <a:prstGeom prst="rect">
+            <a:avLst/>
+          </a:prstGeom>
+          <a:noFill/>
+        </p:spPr>
+        <p:txBody>
+          <a:bodyPr wrap="square" rtlCol="0">
+            <a:spAutoFit/>
+          </a:bodyPr>
+          <a:lstStyle/>
+          <a:p>
+            <a:r>
+              <a:rPr lang="en-US" sz="4000" dirty="0">
+                <a:latin typeface="NanumMyeongjo" charset="-127"/>
+                <a:ea typeface="NanumMyeongjo" charset="-127"/>
+                <a:cs typeface="NanumMyeongjo" charset="-127"/>
+              </a:rPr>
+              <a:t>This research has been partially funded by the European Union's 7th Framework </a:t>
+            </a:r>
+            <a:r>
+              <a:rPr lang="en-US" sz="4000" dirty="0" err="1">
+                <a:latin typeface="NanumMyeongjo" charset="-127"/>
+                <a:ea typeface="NanumMyeongjo" charset="-127"/>
+                <a:cs typeface="NanumMyeongjo" charset="-127"/>
+              </a:rPr>
+              <a:t>Programme</a:t>
+            </a:r>
+            <a:r>
+              <a:rPr lang="en-US" sz="4000" dirty="0">
+                <a:latin typeface="NanumMyeongjo" charset="-127"/>
+                <a:ea typeface="NanumMyeongjo" charset="-127"/>
+                <a:cs typeface="NanumMyeongjo" charset="-127"/>
+              </a:rPr>
+              <a:t> via the project Apps4EU (GA No. 325090)</a:t>
+            </a:r>
+          </a:p>
+        </p:txBody>
+      </p:sp>
+      <p:cxnSp>
+        <p:nvCxnSpPr>
+          <p:cNvPr id="28" name="Straight Connector 27"/>
+          <p:cNvCxnSpPr/>
+          <p:nvPr/>
+        </p:nvCxnSpPr>
+        <p:spPr>
+          <a:xfrm flipH="1">
+            <a:off x="567442" y="38807502"/>
+            <a:ext cx="28346400" cy="0"/>
+          </a:xfrm>
+          <a:prstGeom prst="line">
+            <a:avLst/>
+          </a:prstGeom>
+        </p:spPr>
+        <p:style>
+          <a:lnRef idx="1">
+            <a:schemeClr val="dk1"/>
+          </a:lnRef>
+          <a:fillRef idx="0">
+            <a:schemeClr val="dk1"/>
+          </a:fillRef>
+          <a:effectRef idx="0">
+            <a:schemeClr val="dk1"/>
+          </a:effectRef>
+          <a:fontRef idx="minor">
+            <a:schemeClr val="tx1"/>
+          </a:fontRef>
+        </p:style>
+      </p:cxnSp>
     </p:spTree>
     <p:extLst>
       <p:ext uri="{BB962C8B-B14F-4D97-AF65-F5344CB8AC3E}">

</xml_diff>